<commit_message>
Début des modifications de fautes d'ortho
</commit_message>
<xml_diff>
--- a/src/powerPointRetex/RETEX1.pptx
+++ b/src/powerPointRetex/RETEX1.pptx
@@ -116,15 +116,6 @@
     </p:ext>
   </p:extLst>
 </p:presentation>
-</file>
-
-<file path=ppt/revisionInfo.xml><?xml version="1.0" encoding="utf-8"?>
-<p1510:revInfo xmlns:a="http://schemas.openxmlformats.org/drawingml/2006/main" xmlns:r="http://schemas.openxmlformats.org/officeDocument/2006/relationships" xmlns:p1510="http://schemas.microsoft.com/office/powerpoint/2015/10/main">
-  <p1510:revLst>
-    <p1510:client id="{9BBBC0EE-ADAB-4B5B-83BF-03E379D003A7}" v="7" dt="2022-04-07T23:46:07.202"/>
-    <p1510:client id="{F425B6B2-0804-4EB7-8DA5-368AA6F243F1}" v="6" dt="2022-04-07T23:29:10.047"/>
-  </p1510:revLst>
-</p1510:revInfo>
 </file>
 
 <file path=ppt/changesInfos/changesInfo1.xml><?xml version="1.0" encoding="utf-8"?>
@@ -379,6 +370,54 @@
       </pc:sldChg>
     </pc:docChg>
   </pc:docChgLst>
+  <pc:docChgLst>
+    <pc:chgData name="Raphaël Velia" userId="3eb11ce8fc4cb32e" providerId="LiveId" clId="{ED27B5BB-1EC0-460B-86F4-8F972A6F53F4}"/>
+    <pc:docChg chg="modSld">
+      <pc:chgData name="Raphaël Velia" userId="3eb11ce8fc4cb32e" providerId="LiveId" clId="{ED27B5BB-1EC0-460B-86F4-8F972A6F53F4}" dt="2022-04-15T18:17:43.461" v="34" actId="20577"/>
+      <pc:docMkLst>
+        <pc:docMk/>
+      </pc:docMkLst>
+      <pc:sldChg chg="modSp mod">
+        <pc:chgData name="Raphaël Velia" userId="3eb11ce8fc4cb32e" providerId="LiveId" clId="{ED27B5BB-1EC0-460B-86F4-8F972A6F53F4}" dt="2022-04-15T18:17:43.461" v="34" actId="20577"/>
+        <pc:sldMkLst>
+          <pc:docMk/>
+          <pc:sldMk cId="0" sldId="257"/>
+        </pc:sldMkLst>
+        <pc:spChg chg="mod">
+          <ac:chgData name="Raphaël Velia" userId="3eb11ce8fc4cb32e" providerId="LiveId" clId="{ED27B5BB-1EC0-460B-86F4-8F972A6F53F4}" dt="2022-04-15T18:15:29.895" v="6" actId="20577"/>
+          <ac:spMkLst>
+            <pc:docMk/>
+            <pc:sldMk cId="0" sldId="257"/>
+            <ac:spMk id="2" creationId="{5F828783-320A-4CB8-ACA3-2228E6EC14FC}"/>
+          </ac:spMkLst>
+        </pc:spChg>
+        <pc:spChg chg="mod">
+          <ac:chgData name="Raphaël Velia" userId="3eb11ce8fc4cb32e" providerId="LiveId" clId="{ED27B5BB-1EC0-460B-86F4-8F972A6F53F4}" dt="2022-04-15T18:17:43.461" v="34" actId="20577"/>
+          <ac:spMkLst>
+            <pc:docMk/>
+            <pc:sldMk cId="0" sldId="257"/>
+            <ac:spMk id="48" creationId="{00000000-0000-0000-0000-000000000000}"/>
+          </ac:spMkLst>
+        </pc:spChg>
+        <pc:spChg chg="mod">
+          <ac:chgData name="Raphaël Velia" userId="3eb11ce8fc4cb32e" providerId="LiveId" clId="{ED27B5BB-1EC0-460B-86F4-8F972A6F53F4}" dt="2022-04-15T18:16:37.409" v="12" actId="20577"/>
+          <ac:spMkLst>
+            <pc:docMk/>
+            <pc:sldMk cId="0" sldId="257"/>
+            <ac:spMk id="53" creationId="{00000000-0000-0000-0000-000000000000}"/>
+          </ac:spMkLst>
+        </pc:spChg>
+        <pc:spChg chg="mod">
+          <ac:chgData name="Raphaël Velia" userId="3eb11ce8fc4cb32e" providerId="LiveId" clId="{ED27B5BB-1EC0-460B-86F4-8F972A6F53F4}" dt="2022-04-15T18:15:56.336" v="11" actId="20577"/>
+          <ac:spMkLst>
+            <pc:docMk/>
+            <pc:sldMk cId="0" sldId="257"/>
+            <ac:spMk id="55" creationId="{00000000-0000-0000-0000-000000000000}"/>
+          </ac:spMkLst>
+        </pc:spChg>
+      </pc:sldChg>
+    </pc:docChg>
+  </pc:docChgLst>
 </pc:chgInfo>
 </file>
 
@@ -529,7 +568,7 @@
           <a:p>
             <a:fld id="{2CAC2BAB-AE5F-4D39-826B-2E45AB2A4B9A}" type="datetimeFigureOut">
               <a:rPr lang="fr-FR" smtClean="0"/>
-              <a:t>08/04/2022</a:t>
+              <a:t>15/04/2022</a:t>
             </a:fld>
             <a:endParaRPr lang="fr-FR"/>
           </a:p>
@@ -727,7 +766,7 @@
           <a:p>
             <a:fld id="{2CAC2BAB-AE5F-4D39-826B-2E45AB2A4B9A}" type="datetimeFigureOut">
               <a:rPr lang="fr-FR" smtClean="0"/>
-              <a:t>08/04/2022</a:t>
+              <a:t>15/04/2022</a:t>
             </a:fld>
             <a:endParaRPr lang="fr-FR"/>
           </a:p>
@@ -935,7 +974,7 @@
           <a:p>
             <a:fld id="{2CAC2BAB-AE5F-4D39-826B-2E45AB2A4B9A}" type="datetimeFigureOut">
               <a:rPr lang="fr-FR" smtClean="0"/>
-              <a:t>08/04/2022</a:t>
+              <a:t>15/04/2022</a:t>
             </a:fld>
             <a:endParaRPr lang="fr-FR"/>
           </a:p>
@@ -1239,7 +1278,7 @@
           <a:p>
             <a:fld id="{2CAC2BAB-AE5F-4D39-826B-2E45AB2A4B9A}" type="datetimeFigureOut">
               <a:rPr lang="fr-FR" smtClean="0"/>
-              <a:t>08/04/2022</a:t>
+              <a:t>15/04/2022</a:t>
             </a:fld>
             <a:endParaRPr lang="fr-FR"/>
           </a:p>
@@ -1514,7 +1553,7 @@
           <a:p>
             <a:fld id="{2CAC2BAB-AE5F-4D39-826B-2E45AB2A4B9A}" type="datetimeFigureOut">
               <a:rPr lang="fr-FR" smtClean="0"/>
-              <a:t>08/04/2022</a:t>
+              <a:t>15/04/2022</a:t>
             </a:fld>
             <a:endParaRPr lang="fr-FR"/>
           </a:p>
@@ -1779,7 +1818,7 @@
           <a:p>
             <a:fld id="{2CAC2BAB-AE5F-4D39-826B-2E45AB2A4B9A}" type="datetimeFigureOut">
               <a:rPr lang="fr-FR" smtClean="0"/>
-              <a:t>08/04/2022</a:t>
+              <a:t>15/04/2022</a:t>
             </a:fld>
             <a:endParaRPr lang="fr-FR"/>
           </a:p>
@@ -2191,7 +2230,7 @@
           <a:p>
             <a:fld id="{2CAC2BAB-AE5F-4D39-826B-2E45AB2A4B9A}" type="datetimeFigureOut">
               <a:rPr lang="fr-FR" smtClean="0"/>
-              <a:t>08/04/2022</a:t>
+              <a:t>15/04/2022</a:t>
             </a:fld>
             <a:endParaRPr lang="fr-FR"/>
           </a:p>
@@ -2332,7 +2371,7 @@
           <a:p>
             <a:fld id="{2CAC2BAB-AE5F-4D39-826B-2E45AB2A4B9A}" type="datetimeFigureOut">
               <a:rPr lang="fr-FR" smtClean="0"/>
-              <a:t>08/04/2022</a:t>
+              <a:t>15/04/2022</a:t>
             </a:fld>
             <a:endParaRPr lang="fr-FR"/>
           </a:p>
@@ -2445,7 +2484,7 @@
           <a:p>
             <a:fld id="{2CAC2BAB-AE5F-4D39-826B-2E45AB2A4B9A}" type="datetimeFigureOut">
               <a:rPr lang="fr-FR" smtClean="0"/>
-              <a:t>08/04/2022</a:t>
+              <a:t>15/04/2022</a:t>
             </a:fld>
             <a:endParaRPr lang="fr-FR"/>
           </a:p>
@@ -2756,7 +2795,7 @@
           <a:p>
             <a:fld id="{2CAC2BAB-AE5F-4D39-826B-2E45AB2A4B9A}" type="datetimeFigureOut">
               <a:rPr lang="fr-FR" smtClean="0"/>
-              <a:t>08/04/2022</a:t>
+              <a:t>15/04/2022</a:t>
             </a:fld>
             <a:endParaRPr lang="fr-FR"/>
           </a:p>
@@ -3044,7 +3083,7 @@
           <a:p>
             <a:fld id="{2CAC2BAB-AE5F-4D39-826B-2E45AB2A4B9A}" type="datetimeFigureOut">
               <a:rPr lang="fr-FR" smtClean="0"/>
-              <a:t>08/04/2022</a:t>
+              <a:t>15/04/2022</a:t>
             </a:fld>
             <a:endParaRPr lang="fr-FR"/>
           </a:p>
@@ -3285,7 +3324,7 @@
           <a:p>
             <a:fld id="{2CAC2BAB-AE5F-4D39-826B-2E45AB2A4B9A}" type="datetimeFigureOut">
               <a:rPr lang="fr-FR" smtClean="0"/>
-              <a:t>08/04/2022</a:t>
+              <a:t>15/04/2022</a:t>
             </a:fld>
             <a:endParaRPr lang="fr-FR"/>
           </a:p>
@@ -4157,7 +4196,16 @@
                 </a:solidFill>
                 <a:latin typeface="Calibri"/>
               </a:rPr>
-              <a:t> et le langage de programmation utilisé était </a:t>
+              <a:t> et le langage </a:t>
+            </a:r>
+            <a:r>
+              <a:rPr lang="fr-FR" sz="1800" b="0" strike="noStrike" spc="-1">
+                <a:solidFill>
+                  <a:srgbClr val="000000"/>
+                </a:solidFill>
+                <a:latin typeface="Calibri"/>
+              </a:rPr>
+              <a:t>de programmation </a:t>
             </a:r>
             <a:r>
               <a:rPr lang="fr-FR" sz="1800" b="1" u="sng" strike="noStrike" spc="-1" dirty="0">
@@ -4501,7 +4549,7 @@
                 </a:solidFill>
                 <a:latin typeface="Calibri"/>
               </a:rPr>
-              <a:t>Mettre en place des collisions entre raquettes et balle</a:t>
+              <a:t>Mettre en place des collisions entre raquettes et balles</a:t>
             </a:r>
             <a:endParaRPr lang="fr-FR" sz="1400" b="0" strike="noStrike" spc="-1" dirty="0">
               <a:latin typeface="Arial"/>
@@ -4525,7 +4573,7 @@
                 </a:solidFill>
                 <a:latin typeface="Calibri"/>
               </a:rPr>
-              <a:t>Créer un menu principale avec plusieurs boutons</a:t>
+              <a:t>Créer un menu principal avec plusieurs boutons</a:t>
             </a:r>
             <a:endParaRPr lang="fr-FR" sz="1400" b="0" strike="noStrike" spc="-1" dirty="0">
               <a:latin typeface="Arial"/>
@@ -4549,7 +4597,7 @@
                 </a:solidFill>
                 <a:latin typeface="Calibri"/>
               </a:rPr>
-              <a:t>Changer le nombre de balle (1 ou 4) au démarrage</a:t>
+              <a:t>Changer le nombre de balles (1 ou 4) au démarrage</a:t>
             </a:r>
             <a:endParaRPr lang="fr-FR" sz="1400" b="0" strike="noStrike" spc="-1" dirty="0">
               <a:latin typeface="Arial"/>
@@ -4796,7 +4844,7 @@
                 </a:solidFill>
                 <a:latin typeface="Calibri"/>
               </a:rPr>
-              <a:t>Mais j’ai aussi développer des compétences telles que:</a:t>
+              <a:t>Mais j’ai aussi développé des compétences telles que:</a:t>
             </a:r>
             <a:endParaRPr lang="fr-FR" sz="1400" b="0" strike="noStrike" spc="-1" dirty="0">
               <a:latin typeface="Arial"/>
@@ -4994,19 +5042,14 @@
           <a:p>
             <a:r>
               <a:rPr lang="fr-FR" sz="1600" dirty="0"/>
-              <a:t>Voici le menu principale </a:t>
+              <a:t>Voici le menu principal </a:t>
             </a:r>
           </a:p>
           <a:p>
             <a:r>
               <a:rPr lang="fr-FR" sz="1600" dirty="0"/>
-              <a:t>ainsi que l’écran en pleine partie du jeu </a:t>
-            </a:r>
-            <a:r>
-              <a:rPr lang="fr-FR" sz="1600"/>
-              <a:t>Pong livré.</a:t>
-            </a:r>
-            <a:endParaRPr lang="fr-FR" sz="1600" dirty="0"/>
+              <a:t>ainsi que l’écran en pleine partie du jeu Pong livré.</a:t>
+            </a:r>
           </a:p>
         </p:txBody>
       </p:sp>
@@ -12757,18 +12800,18 @@
 </file>
 
 <file path=customXml/item1.xml><?xml version="1.0" encoding="utf-8"?>
+<p:properties xmlns:p="http://schemas.microsoft.com/office/2006/metadata/properties" xmlns:xsi="http://www.w3.org/2001/XMLSchema-instance" xmlns:pc="http://schemas.microsoft.com/office/infopath/2007/PartnerControls">
+  <documentManagement/>
+</p:properties>
+</file>
+
+<file path=customXml/item2.xml><?xml version="1.0" encoding="utf-8"?>
 <?mso-contentType ?>
 <FormTemplates xmlns="http://schemas.microsoft.com/sharepoint/v3/contenttype/forms">
   <Display>DocumentLibraryForm</Display>
   <Edit>DocumentLibraryForm</Edit>
   <New>DocumentLibraryForm</New>
 </FormTemplates>
-</file>
-
-<file path=customXml/item2.xml><?xml version="1.0" encoding="utf-8"?>
-<p:properties xmlns:p="http://schemas.microsoft.com/office/2006/metadata/properties" xmlns:xsi="http://www.w3.org/2001/XMLSchema-instance" xmlns:pc="http://schemas.microsoft.com/office/infopath/2007/PartnerControls">
-  <documentManagement/>
-</p:properties>
 </file>
 
 <file path=customXml/item3.xml><?xml version="1.0" encoding="utf-8"?>
@@ -12904,14 +12947,6 @@
 </file>
 
 <file path=customXml/itemProps1.xml><?xml version="1.0" encoding="utf-8"?>
-<ds:datastoreItem xmlns:ds="http://schemas.openxmlformats.org/officeDocument/2006/customXml" ds:itemID="{D3BA7CAB-2E58-4FA8-88F3-95FC6951F766}">
-  <ds:schemaRefs>
-    <ds:schemaRef ds:uri="http://schemas.microsoft.com/sharepoint/v3/contenttype/forms"/>
-  </ds:schemaRefs>
-</ds:datastoreItem>
-</file>
-
-<file path=customXml/itemProps2.xml><?xml version="1.0" encoding="utf-8"?>
 <ds:datastoreItem xmlns:ds="http://schemas.openxmlformats.org/officeDocument/2006/customXml" ds:itemID="{280B74D9-0CC4-4695-95DA-226427D16566}">
   <ds:schemaRefs>
     <ds:schemaRef ds:uri="http://purl.org/dc/dcmitype/"/>
@@ -12923,6 +12958,14 @@
     <ds:schemaRef ds:uri="http://schemas.microsoft.com/office/2006/documentManagement/types"/>
     <ds:schemaRef ds:uri="http://purl.org/dc/elements/1.1/"/>
     <ds:schemaRef ds:uri="http://www.w3.org/XML/1998/namespace"/>
+  </ds:schemaRefs>
+</ds:datastoreItem>
+</file>
+
+<file path=customXml/itemProps2.xml><?xml version="1.0" encoding="utf-8"?>
+<ds:datastoreItem xmlns:ds="http://schemas.openxmlformats.org/officeDocument/2006/customXml" ds:itemID="{D3BA7CAB-2E58-4FA8-88F3-95FC6951F766}">
+  <ds:schemaRefs>
+    <ds:schemaRef ds:uri="http://schemas.microsoft.com/sharepoint/v3/contenttype/forms"/>
   </ds:schemaRefs>
 </ds:datastoreItem>
 </file>

</xml_diff>

<commit_message>
Final modifications to my WebSite
</commit_message>
<xml_diff>
--- a/src/powerPointRetex/RETEX1.pptx
+++ b/src/powerPointRetex/RETEX1.pptx
@@ -372,8 +372,8 @@
   </pc:docChgLst>
   <pc:docChgLst>
     <pc:chgData name="Raphaël Velia" userId="3eb11ce8fc4cb32e" providerId="LiveId" clId="{ED27B5BB-1EC0-460B-86F4-8F972A6F53F4}"/>
-    <pc:docChg chg="modSld">
-      <pc:chgData name="Raphaël Velia" userId="3eb11ce8fc4cb32e" providerId="LiveId" clId="{ED27B5BB-1EC0-460B-86F4-8F972A6F53F4}" dt="2022-04-15T18:17:43.461" v="34" actId="20577"/>
+    <pc:docChg chg="undo custSel modSld">
+      <pc:chgData name="Raphaël Velia" userId="3eb11ce8fc4cb32e" providerId="LiveId" clId="{ED27B5BB-1EC0-460B-86F4-8F972A6F53F4}" dt="2022-04-15T21:00:08.519" v="118" actId="20577"/>
       <pc:docMkLst>
         <pc:docMk/>
       </pc:docMkLst>
@@ -412,6 +412,192 @@
           <ac:spMkLst>
             <pc:docMk/>
             <pc:sldMk cId="0" sldId="257"/>
+            <ac:spMk id="55" creationId="{00000000-0000-0000-0000-000000000000}"/>
+          </ac:spMkLst>
+        </pc:spChg>
+      </pc:sldChg>
+      <pc:sldChg chg="modSp mod">
+        <pc:chgData name="Raphaël Velia" userId="3eb11ce8fc4cb32e" providerId="LiveId" clId="{ED27B5BB-1EC0-460B-86F4-8F972A6F53F4}" dt="2022-04-15T20:47:37.483" v="46" actId="20577"/>
+        <pc:sldMkLst>
+          <pc:docMk/>
+          <pc:sldMk cId="818004674" sldId="258"/>
+        </pc:sldMkLst>
+        <pc:spChg chg="mod">
+          <ac:chgData name="Raphaël Velia" userId="3eb11ce8fc4cb32e" providerId="LiveId" clId="{ED27B5BB-1EC0-460B-86F4-8F972A6F53F4}" dt="2022-04-15T20:46:52.203" v="41" actId="15"/>
+          <ac:spMkLst>
+            <pc:docMk/>
+            <pc:sldMk cId="818004674" sldId="258"/>
+            <ac:spMk id="3" creationId="{8C6E18C1-BAB2-4200-A476-325C15964DD6}"/>
+          </ac:spMkLst>
+        </pc:spChg>
+        <pc:spChg chg="mod">
+          <ac:chgData name="Raphaël Velia" userId="3eb11ce8fc4cb32e" providerId="LiveId" clId="{ED27B5BB-1EC0-460B-86F4-8F972A6F53F4}" dt="2022-04-15T20:46:41.343" v="37" actId="20577"/>
+          <ac:spMkLst>
+            <pc:docMk/>
+            <pc:sldMk cId="818004674" sldId="258"/>
+            <ac:spMk id="48" creationId="{00000000-0000-0000-0000-000000000000}"/>
+          </ac:spMkLst>
+        </pc:spChg>
+        <pc:spChg chg="mod">
+          <ac:chgData name="Raphaël Velia" userId="3eb11ce8fc4cb32e" providerId="LiveId" clId="{ED27B5BB-1EC0-460B-86F4-8F972A6F53F4}" dt="2022-04-15T20:47:37.483" v="46" actId="20577"/>
+          <ac:spMkLst>
+            <pc:docMk/>
+            <pc:sldMk cId="818004674" sldId="258"/>
+            <ac:spMk id="55" creationId="{00000000-0000-0000-0000-000000000000}"/>
+          </ac:spMkLst>
+        </pc:spChg>
+      </pc:sldChg>
+      <pc:sldChg chg="modSp mod">
+        <pc:chgData name="Raphaël Velia" userId="3eb11ce8fc4cb32e" providerId="LiveId" clId="{ED27B5BB-1EC0-460B-86F4-8F972A6F53F4}" dt="2022-04-15T20:50:29.134" v="67" actId="20577"/>
+        <pc:sldMkLst>
+          <pc:docMk/>
+          <pc:sldMk cId="1350808449" sldId="259"/>
+        </pc:sldMkLst>
+        <pc:spChg chg="mod">
+          <ac:chgData name="Raphaël Velia" userId="3eb11ce8fc4cb32e" providerId="LiveId" clId="{ED27B5BB-1EC0-460B-86F4-8F972A6F53F4}" dt="2022-04-15T20:49:27.897" v="53" actId="20577"/>
+          <ac:spMkLst>
+            <pc:docMk/>
+            <pc:sldMk cId="1350808449" sldId="259"/>
+            <ac:spMk id="48" creationId="{00000000-0000-0000-0000-000000000000}"/>
+          </ac:spMkLst>
+        </pc:spChg>
+        <pc:spChg chg="mod">
+          <ac:chgData name="Raphaël Velia" userId="3eb11ce8fc4cb32e" providerId="LiveId" clId="{ED27B5BB-1EC0-460B-86F4-8F972A6F53F4}" dt="2022-04-15T20:49:05.425" v="50" actId="20577"/>
+          <ac:spMkLst>
+            <pc:docMk/>
+            <pc:sldMk cId="1350808449" sldId="259"/>
+            <ac:spMk id="53" creationId="{00000000-0000-0000-0000-000000000000}"/>
+          </ac:spMkLst>
+        </pc:spChg>
+        <pc:spChg chg="mod">
+          <ac:chgData name="Raphaël Velia" userId="3eb11ce8fc4cb32e" providerId="LiveId" clId="{ED27B5BB-1EC0-460B-86F4-8F972A6F53F4}" dt="2022-04-15T20:50:29.134" v="67" actId="20577"/>
+          <ac:spMkLst>
+            <pc:docMk/>
+            <pc:sldMk cId="1350808449" sldId="259"/>
+            <ac:spMk id="55" creationId="{00000000-0000-0000-0000-000000000000}"/>
+          </ac:spMkLst>
+        </pc:spChg>
+      </pc:sldChg>
+      <pc:sldChg chg="modSp mod">
+        <pc:chgData name="Raphaël Velia" userId="3eb11ce8fc4cb32e" providerId="LiveId" clId="{ED27B5BB-1EC0-460B-86F4-8F972A6F53F4}" dt="2022-04-15T20:53:26.551" v="74" actId="20577"/>
+        <pc:sldMkLst>
+          <pc:docMk/>
+          <pc:sldMk cId="3122860846" sldId="260"/>
+        </pc:sldMkLst>
+        <pc:spChg chg="mod">
+          <ac:chgData name="Raphaël Velia" userId="3eb11ce8fc4cb32e" providerId="LiveId" clId="{ED27B5BB-1EC0-460B-86F4-8F972A6F53F4}" dt="2022-04-15T20:53:26.551" v="74" actId="20577"/>
+          <ac:spMkLst>
+            <pc:docMk/>
+            <pc:sldMk cId="3122860846" sldId="260"/>
+            <ac:spMk id="2" creationId="{A55502FD-CA5A-4670-8BB5-85BEACCADF25}"/>
+          </ac:spMkLst>
+        </pc:spChg>
+        <pc:spChg chg="mod">
+          <ac:chgData name="Raphaël Velia" userId="3eb11ce8fc4cb32e" providerId="LiveId" clId="{ED27B5BB-1EC0-460B-86F4-8F972A6F53F4}" dt="2022-04-15T20:52:07.551" v="70" actId="20577"/>
+          <ac:spMkLst>
+            <pc:docMk/>
+            <pc:sldMk cId="3122860846" sldId="260"/>
+            <ac:spMk id="48" creationId="{00000000-0000-0000-0000-000000000000}"/>
+          </ac:spMkLst>
+        </pc:spChg>
+        <pc:spChg chg="mod">
+          <ac:chgData name="Raphaël Velia" userId="3eb11ce8fc4cb32e" providerId="LiveId" clId="{ED27B5BB-1EC0-460B-86F4-8F972A6F53F4}" dt="2022-04-15T20:52:59.037" v="73" actId="20577"/>
+          <ac:spMkLst>
+            <pc:docMk/>
+            <pc:sldMk cId="3122860846" sldId="260"/>
+            <ac:spMk id="55" creationId="{00000000-0000-0000-0000-000000000000}"/>
+          </ac:spMkLst>
+        </pc:spChg>
+      </pc:sldChg>
+      <pc:sldChg chg="modSp mod">
+        <pc:chgData name="Raphaël Velia" userId="3eb11ce8fc4cb32e" providerId="LiveId" clId="{ED27B5BB-1EC0-460B-86F4-8F972A6F53F4}" dt="2022-04-15T20:56:37.677" v="83" actId="20577"/>
+        <pc:sldMkLst>
+          <pc:docMk/>
+          <pc:sldMk cId="1718608273" sldId="261"/>
+        </pc:sldMkLst>
+        <pc:spChg chg="mod">
+          <ac:chgData name="Raphaël Velia" userId="3eb11ce8fc4cb32e" providerId="LiveId" clId="{ED27B5BB-1EC0-460B-86F4-8F972A6F53F4}" dt="2022-04-15T20:56:37.677" v="83" actId="20577"/>
+          <ac:spMkLst>
+            <pc:docMk/>
+            <pc:sldMk cId="1718608273" sldId="261"/>
+            <ac:spMk id="48" creationId="{00000000-0000-0000-0000-000000000000}"/>
+          </ac:spMkLst>
+        </pc:spChg>
+        <pc:spChg chg="mod">
+          <ac:chgData name="Raphaël Velia" userId="3eb11ce8fc4cb32e" providerId="LiveId" clId="{ED27B5BB-1EC0-460B-86F4-8F972A6F53F4}" dt="2022-04-15T20:55:21.471" v="77" actId="20577"/>
+          <ac:spMkLst>
+            <pc:docMk/>
+            <pc:sldMk cId="1718608273" sldId="261"/>
+            <ac:spMk id="53" creationId="{00000000-0000-0000-0000-000000000000}"/>
+          </ac:spMkLst>
+        </pc:spChg>
+        <pc:spChg chg="mod">
+          <ac:chgData name="Raphaël Velia" userId="3eb11ce8fc4cb32e" providerId="LiveId" clId="{ED27B5BB-1EC0-460B-86F4-8F972A6F53F4}" dt="2022-04-15T20:56:23.811" v="82" actId="20577"/>
+          <ac:spMkLst>
+            <pc:docMk/>
+            <pc:sldMk cId="1718608273" sldId="261"/>
+            <ac:spMk id="55" creationId="{00000000-0000-0000-0000-000000000000}"/>
+          </ac:spMkLst>
+        </pc:spChg>
+      </pc:sldChg>
+      <pc:sldChg chg="modSp mod">
+        <pc:chgData name="Raphaël Velia" userId="3eb11ce8fc4cb32e" providerId="LiveId" clId="{ED27B5BB-1EC0-460B-86F4-8F972A6F53F4}" dt="2022-04-15T20:58:18.448" v="97" actId="20577"/>
+        <pc:sldMkLst>
+          <pc:docMk/>
+          <pc:sldMk cId="2233224196" sldId="262"/>
+        </pc:sldMkLst>
+        <pc:spChg chg="mod">
+          <ac:chgData name="Raphaël Velia" userId="3eb11ce8fc4cb32e" providerId="LiveId" clId="{ED27B5BB-1EC0-460B-86F4-8F972A6F53F4}" dt="2022-04-15T20:58:18.448" v="97" actId="20577"/>
+          <ac:spMkLst>
+            <pc:docMk/>
+            <pc:sldMk cId="2233224196" sldId="262"/>
+            <ac:spMk id="2" creationId="{F90A258B-6345-482A-9DD6-28B005B0710D}"/>
+          </ac:spMkLst>
+        </pc:spChg>
+        <pc:spChg chg="mod">
+          <ac:chgData name="Raphaël Velia" userId="3eb11ce8fc4cb32e" providerId="LiveId" clId="{ED27B5BB-1EC0-460B-86F4-8F972A6F53F4}" dt="2022-04-15T20:57:27.133" v="91" actId="20577"/>
+          <ac:spMkLst>
+            <pc:docMk/>
+            <pc:sldMk cId="2233224196" sldId="262"/>
+            <ac:spMk id="53" creationId="{00000000-0000-0000-0000-000000000000}"/>
+          </ac:spMkLst>
+        </pc:spChg>
+        <pc:spChg chg="mod">
+          <ac:chgData name="Raphaël Velia" userId="3eb11ce8fc4cb32e" providerId="LiveId" clId="{ED27B5BB-1EC0-460B-86F4-8F972A6F53F4}" dt="2022-04-15T20:58:05.317" v="94" actId="20577"/>
+          <ac:spMkLst>
+            <pc:docMk/>
+            <pc:sldMk cId="2233224196" sldId="262"/>
+            <ac:spMk id="55" creationId="{00000000-0000-0000-0000-000000000000}"/>
+          </ac:spMkLst>
+        </pc:spChg>
+      </pc:sldChg>
+      <pc:sldChg chg="modSp mod">
+        <pc:chgData name="Raphaël Velia" userId="3eb11ce8fc4cb32e" providerId="LiveId" clId="{ED27B5BB-1EC0-460B-86F4-8F972A6F53F4}" dt="2022-04-15T21:00:08.519" v="118" actId="20577"/>
+        <pc:sldMkLst>
+          <pc:docMk/>
+          <pc:sldMk cId="4115755189" sldId="263"/>
+        </pc:sldMkLst>
+        <pc:spChg chg="mod">
+          <ac:chgData name="Raphaël Velia" userId="3eb11ce8fc4cb32e" providerId="LiveId" clId="{ED27B5BB-1EC0-460B-86F4-8F972A6F53F4}" dt="2022-04-15T21:00:04.283" v="115" actId="20577"/>
+          <ac:spMkLst>
+            <pc:docMk/>
+            <pc:sldMk cId="4115755189" sldId="263"/>
+            <ac:spMk id="48" creationId="{00000000-0000-0000-0000-000000000000}"/>
+          </ac:spMkLst>
+        </pc:spChg>
+        <pc:spChg chg="mod">
+          <ac:chgData name="Raphaël Velia" userId="3eb11ce8fc4cb32e" providerId="LiveId" clId="{ED27B5BB-1EC0-460B-86F4-8F972A6F53F4}" dt="2022-04-15T20:59:02.858" v="108" actId="20577"/>
+          <ac:spMkLst>
+            <pc:docMk/>
+            <pc:sldMk cId="4115755189" sldId="263"/>
+            <ac:spMk id="53" creationId="{00000000-0000-0000-0000-000000000000}"/>
+          </ac:spMkLst>
+        </pc:spChg>
+        <pc:spChg chg="mod">
+          <ac:chgData name="Raphaël Velia" userId="3eb11ce8fc4cb32e" providerId="LiveId" clId="{ED27B5BB-1EC0-460B-86F4-8F972A6F53F4}" dt="2022-04-15T21:00:08.519" v="118" actId="20577"/>
+          <ac:spMkLst>
+            <pc:docMk/>
+            <pc:sldMk cId="4115755189" sldId="263"/>
             <ac:spMk id="55" creationId="{00000000-0000-0000-0000-000000000000}"/>
           </ac:spMkLst>
         </pc:spChg>
@@ -4196,16 +4382,7 @@
                 </a:solidFill>
                 <a:latin typeface="Calibri"/>
               </a:rPr>
-              <a:t> et le langage </a:t>
-            </a:r>
-            <a:r>
-              <a:rPr lang="fr-FR" sz="1800" b="0" strike="noStrike" spc="-1">
-                <a:solidFill>
-                  <a:srgbClr val="000000"/>
-                </a:solidFill>
-                <a:latin typeface="Calibri"/>
-              </a:rPr>
-              <a:t>de programmation </a:t>
+              <a:t> et le langage de programmation </a:t>
             </a:r>
             <a:r>
               <a:rPr lang="fr-FR" sz="1800" b="1" u="sng" strike="noStrike" spc="-1" dirty="0">
@@ -5495,7 +5672,7 @@
                 </a:solidFill>
                 <a:latin typeface="Calibri"/>
               </a:rPr>
-              <a:t>Tout au long du projet nous avons effectué différentes recherches sur les sites concurrents de notre entreprise pour faire en sorte que l’on se créé une place </a:t>
+              <a:t>Tout au long du projet nous avons effectué différentes recherches sur les sites concurrents de notre entreprise pour faire en sorte que l’on se créer une place </a:t>
             </a:r>
             <a:r>
               <a:rPr lang="fr-FR" sz="1600" spc="-1" dirty="0">
@@ -5946,7 +6123,7 @@
                 </a:solidFill>
                 <a:latin typeface="Calibri"/>
               </a:rPr>
-              <a:t>Mais j’ai aussi améliorer ma communication avec mes camarades et le travail que je produit en équipe</a:t>
+              <a:t>Mais j’ai aussi amélioré ma communication avec mes camarades et le travail que je produis en équipe</a:t>
             </a:r>
             <a:endParaRPr lang="fr-FR" sz="1400" b="0" strike="noStrike" spc="-1" dirty="0">
               <a:latin typeface="Arial"/>
@@ -6681,7 +6858,7 @@
                 </a:solidFill>
                 <a:latin typeface="Calibri"/>
               </a:rPr>
-              <a:t>et nous avons coder en langage </a:t>
+              <a:t>et nous avons codé en langage </a:t>
             </a:r>
             <a:r>
               <a:rPr lang="fr-FR" sz="1800" b="1" u="sng" strike="noStrike" spc="-1" dirty="0">
@@ -6779,7 +6956,7 @@
                 </a:solidFill>
                 <a:latin typeface="Calibri"/>
               </a:rPr>
-              <a:t>Ce projet à mené à la réalisation du site web en lien avec le projet de création d’une entreprise</a:t>
+              <a:t>Ce projet a mené à la réalisation du site web en lien avec le projet de création d’une entreprise</a:t>
             </a:r>
             <a:r>
               <a:rPr lang="fr-FR" sz="1400" b="0" strike="noStrike" spc="-1" dirty="0">
@@ -6874,7 +7051,7 @@
                 <a:latin typeface="Calibri" panose="020F0502020204030204" pitchFamily="34" charset="0"/>
                 <a:cs typeface="Calibri" panose="020F0502020204030204" pitchFamily="34" charset="0"/>
               </a:rPr>
-              <a:t>avec 5 pages différentes qui font références à l’entreprise créée auparavant</a:t>
+              <a:t>avec 5 pages différentes qui font référence à l’entreprise créée auparavant</a:t>
             </a:r>
           </a:p>
           <a:p>
@@ -6897,7 +7074,7 @@
                 <a:latin typeface="Calibri" panose="020F0502020204030204" pitchFamily="34" charset="0"/>
                 <a:cs typeface="Calibri" panose="020F0502020204030204" pitchFamily="34" charset="0"/>
               </a:rPr>
-              <a:t>site responsive (lisible sur des surfaces autre qu’un ordinateur)</a:t>
+              <a:t>site responsive (lisible sur des surfaces autres qu’un ordinateur)</a:t>
             </a:r>
             <a:endParaRPr lang="fr-FR" sz="1400" b="0" strike="noStrike" spc="-1" dirty="0">
               <a:latin typeface="Calibri" panose="020F0502020204030204" pitchFamily="34" charset="0"/>
@@ -7027,7 +7204,7 @@
                 </a:solidFill>
                 <a:latin typeface="Calibri"/>
               </a:rPr>
-              <a:t>html/css</a:t>
+              <a:t>HTML/CSS</a:t>
             </a:r>
             <a:r>
               <a:rPr lang="fr-FR" sz="1400" b="0" strike="noStrike" spc="-1" dirty="0">
@@ -7120,7 +7297,7 @@
                 </a:solidFill>
                 <a:latin typeface="Calibri"/>
               </a:rPr>
-              <a:t>Redimensionner une page pour quelle soit visible correctement sur un téléphone</a:t>
+              <a:t>Redimensionner une page pour qu’elle soit visible correctement sur un téléphone</a:t>
             </a:r>
             <a:endParaRPr lang="fr-FR" sz="1400" b="0" strike="noStrike" spc="-1" dirty="0">
               <a:latin typeface="Arial"/>
@@ -7157,7 +7334,7 @@
                 <a:latin typeface="Calibri" panose="020F0502020204030204" pitchFamily="34" charset="0"/>
                 <a:cs typeface="Calibri" panose="020F0502020204030204" pitchFamily="34" charset="0"/>
               </a:rPr>
-              <a:t>’ai aussi améliorer ma communication avec mes camarades et ma capacité à travailler en binôme</a:t>
+              <a:t>’ai aussi amélioré ma communication avec mes camarades et ma capacité à travailler en binôme</a:t>
             </a:r>
             <a:endParaRPr lang="fr-FR" sz="1400" b="0" strike="noStrike" spc="-1" dirty="0">
               <a:latin typeface="Calibri" panose="020F0502020204030204" pitchFamily="34" charset="0"/>
@@ -8000,7 +8177,7 @@
                 </a:solidFill>
                 <a:latin typeface="Calibri"/>
               </a:rPr>
-              <a:t>pour créer un schéma entités-association, générer un script de remplissage et un model logique.</a:t>
+              <a:t>pour créer un schéma entités-association, générer un script de remplissage et un modèle logique.</a:t>
             </a:r>
           </a:p>
           <a:p>
@@ -8437,7 +8614,7 @@
                 <a:latin typeface="Calibri" panose="020F0502020204030204" pitchFamily="34" charset="0"/>
                 <a:cs typeface="Calibri" panose="020F0502020204030204" pitchFamily="34" charset="0"/>
               </a:rPr>
-              <a:t>’ai aussi améliorer ma communication avec mes camarades et ma capacité à travailler en binôme</a:t>
+              <a:t>’ai aussi amélioré ma communication avec mes camarades et ma capacité à travailler en binôme</a:t>
             </a:r>
             <a:endParaRPr lang="fr-FR" sz="1400" b="0" strike="noStrike" spc="-1" dirty="0">
               <a:latin typeface="Calibri" panose="020F0502020204030204" pitchFamily="34" charset="0"/>
@@ -8772,7 +8949,7 @@
         <p:spPr>
           <a:xfrm>
             <a:off x="6430055" y="6354590"/>
-            <a:ext cx="5761705" cy="369332"/>
+            <a:ext cx="5851474" cy="369332"/>
           </a:xfrm>
           <a:prstGeom prst="rect">
             <a:avLst/>
@@ -8787,7 +8964,7 @@
           <a:p>
             <a:r>
               <a:rPr lang="fr-FR" dirty="0"/>
-              <a:t>Voici une des maquettes sur toutes celle qui ont été livrées.</a:t>
+              <a:t>Voici une des maquettes sur toutes celles qui ont été livrées.</a:t>
             </a:r>
           </a:p>
         </p:txBody>
@@ -9239,7 +9416,7 @@
                 </a:solidFill>
                 <a:latin typeface="Calibri"/>
               </a:rPr>
-              <a:t>Pour ce projet nous avons utilisé le logiciel VMWare qui nous a servit pour créer une machine virtuelle.</a:t>
+              <a:t>Pour ce projet nous avons utilisé le logiciel VMWare qui nous a servi pour créer une machine virtuelle.</a:t>
             </a:r>
             <a:endParaRPr lang="fr-FR" sz="1800" b="0" strike="noStrike" spc="-1" dirty="0">
               <a:latin typeface="Arial"/>
@@ -9299,7 +9476,7 @@
                 <a:latin typeface="Calibri" panose="020F0502020204030204" pitchFamily="34" charset="0"/>
                 <a:cs typeface="Calibri" panose="020F0502020204030204" pitchFamily="34" charset="0"/>
               </a:rPr>
-              <a:t>Vous êtes un des administrateurs système de l’entreprise BUTGAMES et devez préparer les machines d’une nouvelle équipe de développeurs</a:t>
+              <a:t>Vous êtes un des administrateurs systèmes de l’entreprise BUTGAMES et devez préparer les machines d’une nouvelle équipe de développeurs</a:t>
             </a:r>
             <a:r>
               <a:rPr lang="fr-FR" sz="1400" spc="-1" dirty="0">
@@ -9352,7 +9529,7 @@
                 </a:solidFill>
                 <a:latin typeface="Calibri"/>
               </a:rPr>
-              <a:t>Machine virtuelle sous linux</a:t>
+              <a:t>Machine virtuelle sous Linux</a:t>
             </a:r>
             <a:endParaRPr lang="fr-FR" sz="1200" b="0" strike="noStrike" spc="-1" dirty="0">
               <a:latin typeface="Arial"/>
@@ -9607,16 +9784,7 @@
                 </a:solidFill>
                 <a:latin typeface="Calibri"/>
               </a:rPr>
-              <a:t>Au cours du projet, j’ai développé plusieurs compétences en programmation telles </a:t>
-            </a:r>
-            <a:r>
-              <a:rPr lang="fr-FR" sz="1400" b="0" strike="noStrike" spc="-1">
-                <a:solidFill>
-                  <a:srgbClr val="000000"/>
-                </a:solidFill>
-                <a:latin typeface="Calibri"/>
-              </a:rPr>
-              <a:t>que :</a:t>
+              <a:t>Au cours du projet, j’ai développé plusieurs compétences en programmation telles que :</a:t>
             </a:r>
           </a:p>
           <a:p>
@@ -9649,7 +9817,7 @@
                 <a:latin typeface="Calibri" panose="020F0502020204030204" pitchFamily="34" charset="0"/>
                 <a:cs typeface="Calibri" panose="020F0502020204030204" pitchFamily="34" charset="0"/>
               </a:rPr>
-              <a:t>Installer des logiciel en lign</a:t>
+              <a:t>Installer des logiciels en lign</a:t>
             </a:r>
             <a:r>
               <a:rPr lang="fr-FR" sz="1400" spc="-1" dirty="0">
@@ -9688,7 +9856,7 @@
                 <a:latin typeface="Calibri" panose="020F0502020204030204" pitchFamily="34" charset="0"/>
                 <a:cs typeface="Calibri" panose="020F0502020204030204" pitchFamily="34" charset="0"/>
               </a:rPr>
-              <a:t>/modifier/supprimer des utilisateur d’une machine virtuelle en ligne de commande</a:t>
+              <a:t>/modifier/supprimer des utilisateurs d’une machine virtuelle en ligne de commande</a:t>
             </a:r>
           </a:p>
           <a:p>
@@ -9734,7 +9902,7 @@
                 </a:solidFill>
                 <a:latin typeface="Calibri"/>
               </a:rPr>
-              <a:t>Mais j’ai aussi améliorer ma capacité à travailler en binôme</a:t>
+              <a:t>Mais j’ai aussi amélioré ma capacité à travailler en binôme</a:t>
             </a:r>
             <a:endParaRPr lang="fr-FR" sz="1400" b="0" strike="noStrike" spc="-1" dirty="0">
               <a:latin typeface="Arial"/>
@@ -10622,7 +10790,7 @@
                 </a:solidFill>
                 <a:latin typeface="Calibri"/>
               </a:rPr>
-              <a:t>Faire déplacer des soldats rouge ou noir</a:t>
+              <a:t>Faire déplacer des soldats rouges ou noirs</a:t>
             </a:r>
             <a:endParaRPr lang="fr-FR" sz="1400" b="0" strike="noStrike" spc="-1" dirty="0">
               <a:latin typeface="Arial"/>
@@ -10646,7 +10814,7 @@
                 </a:solidFill>
                 <a:latin typeface="Calibri"/>
               </a:rPr>
-              <a:t>Faire en sorte qu’il puissent attaquer</a:t>
+              <a:t>Faire en sorte qu’ils puissent attaquer</a:t>
             </a:r>
             <a:endParaRPr lang="fr-FR" sz="1400" b="0" strike="noStrike" spc="-1" dirty="0">
               <a:latin typeface="Arial"/>
@@ -10726,7 +10894,7 @@
                 </a:solidFill>
                 <a:latin typeface="Calibri"/>
               </a:rPr>
-              <a:t>Coder une la meilleur IA possible en partant d’un certain niveau dans le jeu pour essayer de battre deux autres IA.</a:t>
+              <a:t>Coder la meilleure IA possible en partant d’un certain niveau dans le jeu pour essayer de battre deux autres IA.</a:t>
             </a:r>
             <a:endParaRPr lang="fr-FR" sz="1400" b="0" strike="noStrike" spc="-1" dirty="0">
               <a:solidFill>
@@ -10970,7 +11138,7 @@
                 </a:solidFill>
                 <a:latin typeface="Calibri"/>
               </a:rPr>
-              <a:t>Mais j’ai aussi améliorer ma capacité à travailler en binôme</a:t>
+              <a:t>Mais j’ai aussi amélioré ma capacité à travailler en binôme</a:t>
             </a:r>
           </a:p>
         </p:txBody>
@@ -11267,7 +11435,7 @@
           <a:p>
             <a:r>
               <a:rPr lang="fr-FR" dirty="0"/>
-              <a:t>J’ai coder les règles du jeu mais je n’ai pas pu toutes les faire.</a:t>
+              <a:t>J’ai codé les règles du jeu mais je n’ai pas pu toutes les faire.</a:t>
             </a:r>
           </a:p>
           <a:p>
@@ -11719,16 +11887,16 @@
               <a:buNone/>
             </a:pPr>
             <a:r>
-              <a:rPr lang="fr-FR" sz="1800" b="0" strike="noStrike" spc="-1" dirty="0">
-                <a:solidFill>
-                  <a:srgbClr val="000000"/>
-                </a:solidFill>
-                <a:latin typeface="Calibri"/>
-              </a:rPr>
-              <a:t>Pour ce projet d’équipes nous avons utilisé une caméra pour la prise de vue et les photos, </a:t>
-            </a:r>
-            <a:r>
-              <a:rPr lang="fr-FR" sz="1800" b="1" u="sng" strike="noStrike" spc="-1" dirty="0">
+              <a:rPr lang="fr-FR" b="0" strike="noStrike" spc="-1" dirty="0">
+                <a:solidFill>
+                  <a:srgbClr val="000000"/>
+                </a:solidFill>
+                <a:latin typeface="Calibri"/>
+              </a:rPr>
+              <a:t>Pour ce projet d’équipe nous avons utilisé une caméra pour la prise de vue et les photos, </a:t>
+            </a:r>
+            <a:r>
+              <a:rPr lang="fr-FR" b="1" u="sng" strike="noStrike" spc="-1" dirty="0">
                 <a:solidFill>
                   <a:srgbClr val="000000"/>
                 </a:solidFill>
@@ -11737,7 +11905,7 @@
               <a:t>Photofiltre</a:t>
             </a:r>
             <a:r>
-              <a:rPr lang="fr-FR" sz="1800" b="0" strike="noStrike" spc="-1" dirty="0">
+              <a:rPr lang="fr-FR" b="0" strike="noStrike" spc="-1" dirty="0">
                 <a:solidFill>
                   <a:srgbClr val="000000"/>
                 </a:solidFill>
@@ -11746,7 +11914,7 @@
               <a:t> pour faire de la retouche ainsi que </a:t>
             </a:r>
             <a:r>
-              <a:rPr lang="fr-FR" sz="1800" b="1" u="sng" strike="noStrike" spc="-1" dirty="0">
+              <a:rPr lang="fr-FR" b="1" u="sng" strike="noStrike" spc="-1" dirty="0">
                 <a:solidFill>
                   <a:srgbClr val="000000"/>
                 </a:solidFill>
@@ -11755,7 +11923,7 @@
               <a:t>PowerDirector</a:t>
             </a:r>
             <a:r>
-              <a:rPr lang="fr-FR" sz="1800" b="0" strike="noStrike" spc="-1" dirty="0">
+              <a:rPr lang="fr-FR" b="0" strike="noStrike" spc="-1" dirty="0">
                 <a:solidFill>
                   <a:srgbClr val="000000"/>
                 </a:solidFill>
@@ -11763,7 +11931,7 @@
               </a:rPr>
               <a:t> pour le montage de la vidéo. Et enfin un micro pour l’enregistrement des voix.</a:t>
             </a:r>
-            <a:endParaRPr lang="fr-FR" sz="1800" b="0" strike="noStrike" spc="-1" dirty="0">
+            <a:endParaRPr lang="fr-FR" b="0" strike="noStrike" spc="-1" dirty="0">
               <a:latin typeface="Arial"/>
             </a:endParaRPr>
           </a:p>
@@ -11823,7 +11991,7 @@
                 </a:solidFill>
                 <a:latin typeface="Calibri"/>
               </a:rPr>
-              <a:t>Ce projet nous a mener à créer une vidéo à présenter à la journée portes ouvertes du département informatique de l’iut de bordeaux. Pour ce faire nous avons dû</a:t>
+              <a:t>Ce projet nous a mené à créer une vidéo à présenter à la journée portes ouvertes du département informatique de l’iut de Bordeaux. Pour ce faire nous avons dû</a:t>
             </a:r>
             <a:r>
               <a:rPr lang="fr-FR" sz="1800" b="0" strike="noStrike" spc="-1" dirty="0">
@@ -11872,7 +12040,7 @@
                 <a:latin typeface="Calibri" panose="020F0502020204030204" pitchFamily="34" charset="0"/>
                 <a:cs typeface="Calibri" panose="020F0502020204030204" pitchFamily="34" charset="0"/>
               </a:rPr>
-              <a:t>Réaliser une vidéo de type </a:t>
+              <a:t>Réaliser une vidéo du type </a:t>
             </a:r>
             <a:r>
               <a:rPr lang="fr-FR" sz="1400" spc="-1" dirty="0" err="1">
@@ -11928,7 +12096,7 @@
                 <a:latin typeface="Calibri" panose="020F0502020204030204" pitchFamily="34" charset="0"/>
                 <a:cs typeface="Calibri" panose="020F0502020204030204" pitchFamily="34" charset="0"/>
               </a:rPr>
-              <a:t>Faire découvrir ce qu’est le BUT informatique de l’iut de bordeaux</a:t>
+              <a:t>Faire découvrir ce qu’est le BUT informatique de l’iut de Bordeaux</a:t>
             </a:r>
           </a:p>
         </p:txBody>
@@ -12069,7 +12237,7 @@
                 </a:solidFill>
                 <a:latin typeface="Calibri"/>
               </a:rPr>
-              <a:t>Faire de la retouche d’une image sur photofiltre</a:t>
+              <a:t>Faire de la retouche d’une image sur Photofiltre</a:t>
             </a:r>
             <a:endParaRPr lang="fr-FR" sz="1400" b="0" strike="noStrike" spc="-1" dirty="0">
               <a:latin typeface="Arial"/>
@@ -12148,7 +12316,25 @@
                 </a:solidFill>
                 <a:latin typeface="Calibri"/>
               </a:rPr>
-              <a:t>Mais j’ai aussi améliorer ma communication et </a:t>
+              <a:t>Mais j’ai </a:t>
+            </a:r>
+            <a:r>
+              <a:rPr lang="fr-FR" sz="1400" b="0" strike="noStrike" spc="-1">
+                <a:solidFill>
+                  <a:srgbClr val="000000"/>
+                </a:solidFill>
+                <a:latin typeface="Calibri"/>
+              </a:rPr>
+              <a:t>aussi amélioré </a:t>
+            </a:r>
+            <a:r>
+              <a:rPr lang="fr-FR" sz="1400" b="0" strike="noStrike" spc="-1" dirty="0">
+                <a:solidFill>
+                  <a:srgbClr val="000000"/>
+                </a:solidFill>
+                <a:latin typeface="Calibri"/>
+              </a:rPr>
+              <a:t>ma communication et </a:t>
             </a:r>
             <a:r>
               <a:rPr lang="fr-FR" sz="1400" spc="-1" dirty="0">
@@ -12800,18 +12986,18 @@
 </file>
 
 <file path=customXml/item1.xml><?xml version="1.0" encoding="utf-8"?>
-<p:properties xmlns:p="http://schemas.microsoft.com/office/2006/metadata/properties" xmlns:xsi="http://www.w3.org/2001/XMLSchema-instance" xmlns:pc="http://schemas.microsoft.com/office/infopath/2007/PartnerControls">
-  <documentManagement/>
-</p:properties>
-</file>
-
-<file path=customXml/item2.xml><?xml version="1.0" encoding="utf-8"?>
 <?mso-contentType ?>
 <FormTemplates xmlns="http://schemas.microsoft.com/sharepoint/v3/contenttype/forms">
   <Display>DocumentLibraryForm</Display>
   <Edit>DocumentLibraryForm</Edit>
   <New>DocumentLibraryForm</New>
 </FormTemplates>
+</file>
+
+<file path=customXml/item2.xml><?xml version="1.0" encoding="utf-8"?>
+<p:properties xmlns:p="http://schemas.microsoft.com/office/2006/metadata/properties" xmlns:xsi="http://www.w3.org/2001/XMLSchema-instance" xmlns:pc="http://schemas.microsoft.com/office/infopath/2007/PartnerControls">
+  <documentManagement/>
+</p:properties>
 </file>
 
 <file path=customXml/item3.xml><?xml version="1.0" encoding="utf-8"?>
@@ -12947,6 +13133,14 @@
 </file>
 
 <file path=customXml/itemProps1.xml><?xml version="1.0" encoding="utf-8"?>
+<ds:datastoreItem xmlns:ds="http://schemas.openxmlformats.org/officeDocument/2006/customXml" ds:itemID="{D3BA7CAB-2E58-4FA8-88F3-95FC6951F766}">
+  <ds:schemaRefs>
+    <ds:schemaRef ds:uri="http://schemas.microsoft.com/sharepoint/v3/contenttype/forms"/>
+  </ds:schemaRefs>
+</ds:datastoreItem>
+</file>
+
+<file path=customXml/itemProps2.xml><?xml version="1.0" encoding="utf-8"?>
 <ds:datastoreItem xmlns:ds="http://schemas.openxmlformats.org/officeDocument/2006/customXml" ds:itemID="{280B74D9-0CC4-4695-95DA-226427D16566}">
   <ds:schemaRefs>
     <ds:schemaRef ds:uri="http://purl.org/dc/dcmitype/"/>
@@ -12958,14 +13152,6 @@
     <ds:schemaRef ds:uri="http://schemas.microsoft.com/office/2006/documentManagement/types"/>
     <ds:schemaRef ds:uri="http://purl.org/dc/elements/1.1/"/>
     <ds:schemaRef ds:uri="http://www.w3.org/XML/1998/namespace"/>
-  </ds:schemaRefs>
-</ds:datastoreItem>
-</file>
-
-<file path=customXml/itemProps2.xml><?xml version="1.0" encoding="utf-8"?>
-<ds:datastoreItem xmlns:ds="http://schemas.openxmlformats.org/officeDocument/2006/customXml" ds:itemID="{D3BA7CAB-2E58-4FA8-88F3-95FC6951F766}">
-  <ds:schemaRefs>
-    <ds:schemaRef ds:uri="http://schemas.microsoft.com/sharepoint/v3/contenttype/forms"/>
   </ds:schemaRefs>
 </ds:datastoreItem>
 </file>

</xml_diff>